<commit_message>
Minor updates in SFC and NVO3 presentations
</commit_message>
<xml_diff>
--- a/presentations/IETF100/IETF100-NVO3-IOAM.pptx
+++ b/presentations/IETF100/IETF100-NVO3-IOAM.pptx
@@ -146,7 +146,7 @@
   </p:defaultTextStyle>
   <p:extLst>
     <p:ext uri="{EFAFB233-063F-42B5-8137-9DF3F51BA10A}">
-      <p15:sldGuideLst xmlns:p15="http://schemas.microsoft.com/office/powerpoint/2012/main">
+      <p15:sldGuideLst xmlns:p15="http://schemas.microsoft.com/office/powerpoint/2012/main" xmlns="">
         <p15:guide id="1" orient="horz" pos="307">
           <p15:clr>
             <a:srgbClr val="A4A3A4"/>
@@ -1569,7 +1569,7 @@
               </a14:hiddenLine>
             </a:ext>
             <a:ext uri="{FAA26D3D-D897-4be2-8F04-BA451C77F1D7}">
-              <ma14:placeholderFlag xmlns="" xmlns:ma14="http://schemas.microsoft.com/office/mac/drawingml/2011/main" val="1"/>
+              <ma14:placeholderFlag xmlns:ma14="http://schemas.microsoft.com/office/mac/drawingml/2011/main" xmlns="" val="1"/>
             </a:ext>
           </a:extLst>
         </p:spPr>
@@ -1964,7 +1964,7 @@
               </a14:hiddenLine>
             </a:ext>
             <a:ext uri="{FAA26D3D-D897-4be2-8F04-BA451C77F1D7}">
-              <ma14:placeholderFlag xmlns="" xmlns:ma14="http://schemas.microsoft.com/office/mac/drawingml/2011/main" val="1"/>
+              <ma14:placeholderFlag xmlns:ma14="http://schemas.microsoft.com/office/mac/drawingml/2011/main" xmlns="" val="1"/>
             </a:ext>
           </a:extLst>
         </p:spPr>
@@ -3627,7 +3627,7 @@
               </a14:hiddenLine>
             </a:ext>
             <a:ext uri="{FAA26D3D-D897-4be2-8F04-BA451C77F1D7}">
-              <ma14:placeholderFlag xmlns="" xmlns:ma14="http://schemas.microsoft.com/office/mac/drawingml/2011/main" val="1"/>
+              <ma14:placeholderFlag xmlns:ma14="http://schemas.microsoft.com/office/mac/drawingml/2011/main" xmlns="" val="1"/>
             </a:ext>
           </a:extLst>
         </p:spPr>
@@ -3722,7 +3722,7 @@
               </a14:hiddenLine>
             </a:ext>
             <a:ext uri="{FAA26D3D-D897-4be2-8F04-BA451C77F1D7}">
-              <ma14:placeholderFlag xmlns="" xmlns:ma14="http://schemas.microsoft.com/office/mac/drawingml/2011/main" val="1"/>
+              <ma14:placeholderFlag xmlns:ma14="http://schemas.microsoft.com/office/mac/drawingml/2011/main" xmlns="" val="1"/>
             </a:ext>
           </a:extLst>
         </p:spPr>
@@ -4256,7 +4256,7 @@
               </a14:hiddenLine>
             </a:ext>
             <a:ext uri="{FAA26D3D-D897-4be2-8F04-BA451C77F1D7}">
-              <ma14:placeholderFlag xmlns="" xmlns:ma14="http://schemas.microsoft.com/office/mac/drawingml/2011/main" val="1"/>
+              <ma14:placeholderFlag xmlns:ma14="http://schemas.microsoft.com/office/mac/drawingml/2011/main" xmlns="" val="1"/>
             </a:ext>
           </a:extLst>
         </p:spPr>
@@ -4466,7 +4466,7 @@
               </a14:hiddenLine>
             </a:ext>
             <a:ext uri="{FAA26D3D-D897-4be2-8F04-BA451C77F1D7}">
-              <ma14:placeholderFlag xmlns="" xmlns:ma14="http://schemas.microsoft.com/office/mac/drawingml/2011/main" val="1"/>
+              <ma14:placeholderFlag xmlns:ma14="http://schemas.microsoft.com/office/mac/drawingml/2011/main" xmlns="" val="1"/>
             </a:ext>
           </a:extLst>
         </p:spPr>
@@ -5037,7 +5037,7 @@
               </a14:hiddenLine>
             </a:ext>
             <a:ext uri="{FAA26D3D-D897-4be2-8F04-BA451C77F1D7}">
-              <ma14:placeholderFlag xmlns="" xmlns:ma14="http://schemas.microsoft.com/office/mac/drawingml/2011/main" val="1"/>
+              <ma14:placeholderFlag xmlns:ma14="http://schemas.microsoft.com/office/mac/drawingml/2011/main" xmlns="" val="1"/>
             </a:ext>
           </a:extLst>
         </p:spPr>
@@ -5257,7 +5257,7 @@
               </a14:hiddenLine>
             </a:ext>
             <a:ext uri="{FAA26D3D-D897-4be2-8F04-BA451C77F1D7}">
-              <ma14:placeholderFlag xmlns="" xmlns:ma14="http://schemas.microsoft.com/office/mac/drawingml/2011/main" val="1"/>
+              <ma14:placeholderFlag xmlns:ma14="http://schemas.microsoft.com/office/mac/drawingml/2011/main" xmlns="" val="1"/>
             </a:ext>
           </a:extLst>
         </p:spPr>
@@ -6107,7 +6107,7 @@
               </a14:hiddenLine>
             </a:ext>
             <a:ext uri="{FAA26D3D-D897-4be2-8F04-BA451C77F1D7}">
-              <ma14:placeholderFlag xmlns="" xmlns:ma14="http://schemas.microsoft.com/office/mac/drawingml/2011/main" val="1"/>
+              <ma14:placeholderFlag xmlns:ma14="http://schemas.microsoft.com/office/mac/drawingml/2011/main" xmlns="" val="1"/>
             </a:ext>
           </a:extLst>
         </p:spPr>
@@ -9715,7 +9715,7 @@
               </a14:hiddenLine>
             </a:ext>
             <a:ext uri="{FAA26D3D-D897-4be2-8F04-BA451C77F1D7}">
-              <ma14:placeholderFlag xmlns="" xmlns:ma14="http://schemas.microsoft.com/office/mac/drawingml/2011/main" val="1"/>
+              <ma14:placeholderFlag xmlns:ma14="http://schemas.microsoft.com/office/mac/drawingml/2011/main" xmlns="" val="1"/>
             </a:ext>
           </a:extLst>
         </p:spPr>
@@ -9931,7 +9931,7 @@
               </a14:hiddenLine>
             </a:ext>
             <a:ext uri="{FAA26D3D-D897-4be2-8F04-BA451C77F1D7}">
-              <ma14:placeholderFlag xmlns="" xmlns:ma14="http://schemas.microsoft.com/office/mac/drawingml/2011/main" val="1"/>
+              <ma14:placeholderFlag xmlns:ma14="http://schemas.microsoft.com/office/mac/drawingml/2011/main" xmlns="" val="1"/>
             </a:ext>
           </a:extLst>
         </p:spPr>
@@ -10147,7 +10147,7 @@
               </a14:hiddenLine>
             </a:ext>
             <a:ext uri="{FAA26D3D-D897-4be2-8F04-BA451C77F1D7}">
-              <ma14:placeholderFlag xmlns="" xmlns:ma14="http://schemas.microsoft.com/office/mac/drawingml/2011/main" val="1"/>
+              <ma14:placeholderFlag xmlns:ma14="http://schemas.microsoft.com/office/mac/drawingml/2011/main" xmlns="" val="1"/>
             </a:ext>
           </a:extLst>
         </p:spPr>
@@ -10558,7 +10558,7 @@
               </a14:hiddenLine>
             </a:ext>
             <a:ext uri="{FAA26D3D-D897-4be2-8F04-BA451C77F1D7}">
-              <ma14:placeholderFlag xmlns="" xmlns:ma14="http://schemas.microsoft.com/office/mac/drawingml/2011/main" val="1"/>
+              <ma14:placeholderFlag xmlns:ma14="http://schemas.microsoft.com/office/mac/drawingml/2011/main" xmlns="" val="1"/>
             </a:ext>
           </a:extLst>
         </p:spPr>
@@ -11902,13 +11902,6 @@
               </a:rPr>
               <a:t>, ..)</a:t>
             </a:r>
-            <a:endParaRPr lang="en-US" sz="1200" kern="0" dirty="0" smtClean="0">
-              <a:solidFill>
-                <a:srgbClr val="676767">
-                  <a:lumMod val="50000"/>
-                </a:srgbClr>
-              </a:solidFill>
-            </a:endParaRPr>
           </a:p>
           <a:p>
             <a:pPr lvl="1" indent="-185738" defTabSz="914400">
@@ -14929,20 +14922,20 @@
                   </a:schemeClr>
                 </a:solidFill>
               </a:rPr>
-              <a:t> </a:t>
-            </a:r>
-            <a:r>
-              <a:rPr lang="en-US" sz="1200" dirty="0" smtClean="0">
+              <a:t> tunnel option limits length to 128 bytes, which limits the range of deployment cases.</a:t>
+            </a:r>
+          </a:p>
+          <a:p>
+            <a:r>
+              <a:rPr lang="en-US" sz="1600" dirty="0" smtClean="0">
                 <a:solidFill>
                   <a:schemeClr val="tx1">
                     <a:lumMod val="50000"/>
                   </a:schemeClr>
                 </a:solidFill>
               </a:rPr>
-              <a:t>tunnel option limits length to 128 bytes, which limits the range of deployment cases.</a:t>
-            </a:r>
-          </a:p>
-          <a:p>
+              <a:t>Metadata approach </a:t>
+            </a:r>
             <a:r>
               <a:rPr lang="en-US" sz="1600" dirty="0" smtClean="0">
                 <a:solidFill>
@@ -14951,21 +14944,21 @@
                   </a:schemeClr>
                 </a:solidFill>
               </a:rPr>
-              <a:t>Hardware-friendly </a:t>
-            </a:r>
-            <a:r>
-              <a:rPr lang="en-US" sz="1600" dirty="0" smtClean="0">
+              <a:t>discussion:</a:t>
+            </a:r>
+          </a:p>
+          <a:p>
+            <a:pPr lvl="1"/>
+            <a:r>
+              <a:rPr lang="en-US" sz="1200" dirty="0" smtClean="0">
                 <a:solidFill>
                   <a:schemeClr val="tx1">
                     <a:lumMod val="50000"/>
                   </a:schemeClr>
                 </a:solidFill>
               </a:rPr>
-              <a:t>implementation discussion:</a:t>
-            </a:r>
-          </a:p>
-          <a:p>
-            <a:pPr lvl="1"/>
+              <a:t>Use </a:t>
+            </a:r>
             <a:r>
               <a:rPr lang="en-US" sz="1200" dirty="0" smtClean="0">
                 <a:solidFill>
@@ -14974,7 +14967,7 @@
                   </a:schemeClr>
                 </a:solidFill>
               </a:rPr>
-              <a:t>Use of the </a:t>
+              <a:t>of the </a:t>
             </a:r>
             <a:r>
               <a:rPr lang="en-US" sz="1200" dirty="0" err="1" smtClean="0">
@@ -15867,13 +15860,6 @@
               </a:rPr>
               <a:t>…</a:t>
             </a:r>
-            <a:endParaRPr lang="en-US" sz="1400" dirty="0" smtClean="0">
-              <a:solidFill>
-                <a:schemeClr val="tx1">
-                  <a:lumMod val="50000"/>
-                </a:schemeClr>
-              </a:solidFill>
-            </a:endParaRPr>
           </a:p>
           <a:p>
             <a:pPr marL="292040" lvl="1" indent="0">

</xml_diff>